<commit_message>
updated ppt for next week
</commit_message>
<xml_diff>
--- a/Reference/Lessons_in_OHI/explore_theory/OHIoverview.pptx
+++ b/Reference/Lessons_in_OHI/explore_theory/OHIoverview.pptx
@@ -167,10 +167,9 @@
           </a:lstStyle>
           <a:p>
             <a:r>
-              <a:rPr lang="en-US" smtClean="0"/>
+              <a:rPr lang="en-US"/>
               <a:t>Click to edit Master title style</a:t>
             </a:r>
-            <a:endParaRPr lang="en-US"/>
           </a:p>
         </p:txBody>
       </p:sp>
@@ -232,10 +231,9 @@
           </a:lstStyle>
           <a:p>
             <a:r>
-              <a:rPr lang="en-US" smtClean="0"/>
+              <a:rPr lang="en-US"/>
               <a:t>Click to edit Master subtitle style</a:t>
             </a:r>
-            <a:endParaRPr lang="en-US"/>
           </a:p>
         </p:txBody>
       </p:sp>
@@ -256,7 +254,7 @@
           <a:p>
             <a:fld id="{6C8DF065-2109-4FE1-9B02-7C1308B814F1}" type="datetimeFigureOut">
               <a:rPr lang="en-US" smtClean="0"/>
-              <a:t>2/11/2019</a:t>
+              <a:t>4/3/20</a:t>
             </a:fld>
             <a:endParaRPr lang="en-US"/>
           </a:p>
@@ -350,10 +348,9 @@
           <a:lstStyle/>
           <a:p>
             <a:r>
-              <a:rPr lang="en-US" smtClean="0"/>
+              <a:rPr lang="en-US"/>
               <a:t>Click to edit Master title style</a:t>
             </a:r>
-            <a:endParaRPr lang="en-US"/>
           </a:p>
         </p:txBody>
       </p:sp>
@@ -374,38 +371,37 @@
           <a:p>
             <a:pPr lvl="0"/>
             <a:r>
-              <a:rPr lang="en-US" smtClean="0"/>
+              <a:rPr lang="en-US"/>
               <a:t>Click to edit Master text styles</a:t>
             </a:r>
           </a:p>
           <a:p>
             <a:pPr lvl="1"/>
             <a:r>
-              <a:rPr lang="en-US" smtClean="0"/>
+              <a:rPr lang="en-US"/>
               <a:t>Second level</a:t>
             </a:r>
           </a:p>
           <a:p>
             <a:pPr lvl="2"/>
             <a:r>
-              <a:rPr lang="en-US" smtClean="0"/>
+              <a:rPr lang="en-US"/>
               <a:t>Third level</a:t>
             </a:r>
           </a:p>
           <a:p>
             <a:pPr lvl="3"/>
             <a:r>
-              <a:rPr lang="en-US" smtClean="0"/>
+              <a:rPr lang="en-US"/>
               <a:t>Fourth level</a:t>
             </a:r>
           </a:p>
           <a:p>
             <a:pPr lvl="4"/>
             <a:r>
-              <a:rPr lang="en-US" smtClean="0"/>
+              <a:rPr lang="en-US"/>
               <a:t>Fifth level</a:t>
             </a:r>
-            <a:endParaRPr lang="en-US"/>
           </a:p>
         </p:txBody>
       </p:sp>
@@ -426,7 +422,7 @@
           <a:p>
             <a:fld id="{6C8DF065-2109-4FE1-9B02-7C1308B814F1}" type="datetimeFigureOut">
               <a:rPr lang="en-US" smtClean="0"/>
-              <a:t>2/11/2019</a:t>
+              <a:t>4/3/20</a:t>
             </a:fld>
             <a:endParaRPr lang="en-US"/>
           </a:p>
@@ -525,10 +521,9 @@
           <a:lstStyle/>
           <a:p>
             <a:r>
-              <a:rPr lang="en-US" smtClean="0"/>
+              <a:rPr lang="en-US"/>
               <a:t>Click to edit Master title style</a:t>
             </a:r>
-            <a:endParaRPr lang="en-US"/>
           </a:p>
         </p:txBody>
       </p:sp>
@@ -554,38 +549,37 @@
           <a:p>
             <a:pPr lvl="0"/>
             <a:r>
-              <a:rPr lang="en-US" smtClean="0"/>
+              <a:rPr lang="en-US"/>
               <a:t>Click to edit Master text styles</a:t>
             </a:r>
           </a:p>
           <a:p>
             <a:pPr lvl="1"/>
             <a:r>
-              <a:rPr lang="en-US" smtClean="0"/>
+              <a:rPr lang="en-US"/>
               <a:t>Second level</a:t>
             </a:r>
           </a:p>
           <a:p>
             <a:pPr lvl="2"/>
             <a:r>
-              <a:rPr lang="en-US" smtClean="0"/>
+              <a:rPr lang="en-US"/>
               <a:t>Third level</a:t>
             </a:r>
           </a:p>
           <a:p>
             <a:pPr lvl="3"/>
             <a:r>
-              <a:rPr lang="en-US" smtClean="0"/>
+              <a:rPr lang="en-US"/>
               <a:t>Fourth level</a:t>
             </a:r>
           </a:p>
           <a:p>
             <a:pPr lvl="4"/>
             <a:r>
-              <a:rPr lang="en-US" smtClean="0"/>
+              <a:rPr lang="en-US"/>
               <a:t>Fifth level</a:t>
             </a:r>
-            <a:endParaRPr lang="en-US"/>
           </a:p>
         </p:txBody>
       </p:sp>
@@ -606,7 +600,7 @@
           <a:p>
             <a:fld id="{6C8DF065-2109-4FE1-9B02-7C1308B814F1}" type="datetimeFigureOut">
               <a:rPr lang="en-US" smtClean="0"/>
-              <a:t>2/11/2019</a:t>
+              <a:t>4/3/20</a:t>
             </a:fld>
             <a:endParaRPr lang="en-US"/>
           </a:p>
@@ -700,10 +694,9 @@
           <a:lstStyle/>
           <a:p>
             <a:r>
-              <a:rPr lang="en-US" smtClean="0"/>
+              <a:rPr lang="en-US"/>
               <a:t>Click to edit Master title style</a:t>
             </a:r>
-            <a:endParaRPr lang="en-US"/>
           </a:p>
         </p:txBody>
       </p:sp>
@@ -724,38 +717,37 @@
           <a:p>
             <a:pPr lvl="0"/>
             <a:r>
-              <a:rPr lang="en-US" smtClean="0"/>
+              <a:rPr lang="en-US"/>
               <a:t>Click to edit Master text styles</a:t>
             </a:r>
           </a:p>
           <a:p>
             <a:pPr lvl="1"/>
             <a:r>
-              <a:rPr lang="en-US" smtClean="0"/>
+              <a:rPr lang="en-US"/>
               <a:t>Second level</a:t>
             </a:r>
           </a:p>
           <a:p>
             <a:pPr lvl="2"/>
             <a:r>
-              <a:rPr lang="en-US" smtClean="0"/>
+              <a:rPr lang="en-US"/>
               <a:t>Third level</a:t>
             </a:r>
           </a:p>
           <a:p>
             <a:pPr lvl="3"/>
             <a:r>
-              <a:rPr lang="en-US" smtClean="0"/>
+              <a:rPr lang="en-US"/>
               <a:t>Fourth level</a:t>
             </a:r>
           </a:p>
           <a:p>
             <a:pPr lvl="4"/>
             <a:r>
-              <a:rPr lang="en-US" smtClean="0"/>
+              <a:rPr lang="en-US"/>
               <a:t>Fifth level</a:t>
             </a:r>
-            <a:endParaRPr lang="en-US"/>
           </a:p>
         </p:txBody>
       </p:sp>
@@ -776,7 +768,7 @@
           <a:p>
             <a:fld id="{6C8DF065-2109-4FE1-9B02-7C1308B814F1}" type="datetimeFigureOut">
               <a:rPr lang="en-US" smtClean="0"/>
-              <a:t>2/11/2019</a:t>
+              <a:t>4/3/20</a:t>
             </a:fld>
             <a:endParaRPr lang="en-US"/>
           </a:p>
@@ -879,10 +871,9 @@
           </a:lstStyle>
           <a:p>
             <a:r>
-              <a:rPr lang="en-US" smtClean="0"/>
+              <a:rPr lang="en-US"/>
               <a:t>Click to edit Master title style</a:t>
             </a:r>
-            <a:endParaRPr lang="en-US"/>
           </a:p>
         </p:txBody>
       </p:sp>
@@ -999,7 +990,7 @@
           <a:p>
             <a:pPr lvl="0"/>
             <a:r>
-              <a:rPr lang="en-US" smtClean="0"/>
+              <a:rPr lang="en-US"/>
               <a:t>Click to edit Master text styles</a:t>
             </a:r>
           </a:p>
@@ -1022,7 +1013,7 @@
           <a:p>
             <a:fld id="{6C8DF065-2109-4FE1-9B02-7C1308B814F1}" type="datetimeFigureOut">
               <a:rPr lang="en-US" smtClean="0"/>
-              <a:t>2/11/2019</a:t>
+              <a:t>4/3/20</a:t>
             </a:fld>
             <a:endParaRPr lang="en-US"/>
           </a:p>
@@ -1116,10 +1107,9 @@
           <a:lstStyle/>
           <a:p>
             <a:r>
-              <a:rPr lang="en-US" smtClean="0"/>
+              <a:rPr lang="en-US"/>
               <a:t>Click to edit Master title style</a:t>
             </a:r>
-            <a:endParaRPr lang="en-US"/>
           </a:p>
         </p:txBody>
       </p:sp>
@@ -1145,38 +1135,37 @@
           <a:p>
             <a:pPr lvl="0"/>
             <a:r>
-              <a:rPr lang="en-US" smtClean="0"/>
+              <a:rPr lang="en-US"/>
               <a:t>Click to edit Master text styles</a:t>
             </a:r>
           </a:p>
           <a:p>
             <a:pPr lvl="1"/>
             <a:r>
-              <a:rPr lang="en-US" smtClean="0"/>
+              <a:rPr lang="en-US"/>
               <a:t>Second level</a:t>
             </a:r>
           </a:p>
           <a:p>
             <a:pPr lvl="2"/>
             <a:r>
-              <a:rPr lang="en-US" smtClean="0"/>
+              <a:rPr lang="en-US"/>
               <a:t>Third level</a:t>
             </a:r>
           </a:p>
           <a:p>
             <a:pPr lvl="3"/>
             <a:r>
-              <a:rPr lang="en-US" smtClean="0"/>
+              <a:rPr lang="en-US"/>
               <a:t>Fourth level</a:t>
             </a:r>
           </a:p>
           <a:p>
             <a:pPr lvl="4"/>
             <a:r>
-              <a:rPr lang="en-US" smtClean="0"/>
+              <a:rPr lang="en-US"/>
               <a:t>Fifth level</a:t>
             </a:r>
-            <a:endParaRPr lang="en-US"/>
           </a:p>
         </p:txBody>
       </p:sp>
@@ -1202,38 +1191,37 @@
           <a:p>
             <a:pPr lvl="0"/>
             <a:r>
-              <a:rPr lang="en-US" smtClean="0"/>
+              <a:rPr lang="en-US"/>
               <a:t>Click to edit Master text styles</a:t>
             </a:r>
           </a:p>
           <a:p>
             <a:pPr lvl="1"/>
             <a:r>
-              <a:rPr lang="en-US" smtClean="0"/>
+              <a:rPr lang="en-US"/>
               <a:t>Second level</a:t>
             </a:r>
           </a:p>
           <a:p>
             <a:pPr lvl="2"/>
             <a:r>
-              <a:rPr lang="en-US" smtClean="0"/>
+              <a:rPr lang="en-US"/>
               <a:t>Third level</a:t>
             </a:r>
           </a:p>
           <a:p>
             <a:pPr lvl="3"/>
             <a:r>
-              <a:rPr lang="en-US" smtClean="0"/>
+              <a:rPr lang="en-US"/>
               <a:t>Fourth level</a:t>
             </a:r>
           </a:p>
           <a:p>
             <a:pPr lvl="4"/>
             <a:r>
-              <a:rPr lang="en-US" smtClean="0"/>
+              <a:rPr lang="en-US"/>
               <a:t>Fifth level</a:t>
             </a:r>
-            <a:endParaRPr lang="en-US"/>
           </a:p>
         </p:txBody>
       </p:sp>
@@ -1254,7 +1242,7 @@
           <a:p>
             <a:fld id="{6C8DF065-2109-4FE1-9B02-7C1308B814F1}" type="datetimeFigureOut">
               <a:rPr lang="en-US" smtClean="0"/>
-              <a:t>2/11/2019</a:t>
+              <a:t>4/3/20</a:t>
             </a:fld>
             <a:endParaRPr lang="en-US"/>
           </a:p>
@@ -1353,10 +1341,9 @@
           <a:lstStyle/>
           <a:p>
             <a:r>
-              <a:rPr lang="en-US" smtClean="0"/>
+              <a:rPr lang="en-US"/>
               <a:t>Click to edit Master title style</a:t>
             </a:r>
-            <a:endParaRPr lang="en-US"/>
           </a:p>
         </p:txBody>
       </p:sp>
@@ -1419,7 +1406,7 @@
           <a:p>
             <a:pPr lvl="0"/>
             <a:r>
-              <a:rPr lang="en-US" smtClean="0"/>
+              <a:rPr lang="en-US"/>
               <a:t>Click to edit Master text styles</a:t>
             </a:r>
           </a:p>
@@ -1447,38 +1434,37 @@
           <a:p>
             <a:pPr lvl="0"/>
             <a:r>
-              <a:rPr lang="en-US" smtClean="0"/>
+              <a:rPr lang="en-US"/>
               <a:t>Click to edit Master text styles</a:t>
             </a:r>
           </a:p>
           <a:p>
             <a:pPr lvl="1"/>
             <a:r>
-              <a:rPr lang="en-US" smtClean="0"/>
+              <a:rPr lang="en-US"/>
               <a:t>Second level</a:t>
             </a:r>
           </a:p>
           <a:p>
             <a:pPr lvl="2"/>
             <a:r>
-              <a:rPr lang="en-US" smtClean="0"/>
+              <a:rPr lang="en-US"/>
               <a:t>Third level</a:t>
             </a:r>
           </a:p>
           <a:p>
             <a:pPr lvl="3"/>
             <a:r>
-              <a:rPr lang="en-US" smtClean="0"/>
+              <a:rPr lang="en-US"/>
               <a:t>Fourth level</a:t>
             </a:r>
           </a:p>
           <a:p>
             <a:pPr lvl="4"/>
             <a:r>
-              <a:rPr lang="en-US" smtClean="0"/>
+              <a:rPr lang="en-US"/>
               <a:t>Fifth level</a:t>
             </a:r>
-            <a:endParaRPr lang="en-US"/>
           </a:p>
         </p:txBody>
       </p:sp>
@@ -1541,7 +1527,7 @@
           <a:p>
             <a:pPr lvl="0"/>
             <a:r>
-              <a:rPr lang="en-US" smtClean="0"/>
+              <a:rPr lang="en-US"/>
               <a:t>Click to edit Master text styles</a:t>
             </a:r>
           </a:p>
@@ -1569,38 +1555,37 @@
           <a:p>
             <a:pPr lvl="0"/>
             <a:r>
-              <a:rPr lang="en-US" smtClean="0"/>
+              <a:rPr lang="en-US"/>
               <a:t>Click to edit Master text styles</a:t>
             </a:r>
           </a:p>
           <a:p>
             <a:pPr lvl="1"/>
             <a:r>
-              <a:rPr lang="en-US" smtClean="0"/>
+              <a:rPr lang="en-US"/>
               <a:t>Second level</a:t>
             </a:r>
           </a:p>
           <a:p>
             <a:pPr lvl="2"/>
             <a:r>
-              <a:rPr lang="en-US" smtClean="0"/>
+              <a:rPr lang="en-US"/>
               <a:t>Third level</a:t>
             </a:r>
           </a:p>
           <a:p>
             <a:pPr lvl="3"/>
             <a:r>
-              <a:rPr lang="en-US" smtClean="0"/>
+              <a:rPr lang="en-US"/>
               <a:t>Fourth level</a:t>
             </a:r>
           </a:p>
           <a:p>
             <a:pPr lvl="4"/>
             <a:r>
-              <a:rPr lang="en-US" smtClean="0"/>
+              <a:rPr lang="en-US"/>
               <a:t>Fifth level</a:t>
             </a:r>
-            <a:endParaRPr lang="en-US"/>
           </a:p>
         </p:txBody>
       </p:sp>
@@ -1621,7 +1606,7 @@
           <a:p>
             <a:fld id="{6C8DF065-2109-4FE1-9B02-7C1308B814F1}" type="datetimeFigureOut">
               <a:rPr lang="en-US" smtClean="0"/>
-              <a:t>2/11/2019</a:t>
+              <a:t>4/3/20</a:t>
             </a:fld>
             <a:endParaRPr lang="en-US"/>
           </a:p>
@@ -1715,10 +1700,9 @@
           <a:lstStyle/>
           <a:p>
             <a:r>
-              <a:rPr lang="en-US" smtClean="0"/>
+              <a:rPr lang="en-US"/>
               <a:t>Click to edit Master title style</a:t>
             </a:r>
-            <a:endParaRPr lang="en-US"/>
           </a:p>
         </p:txBody>
       </p:sp>
@@ -1739,7 +1723,7 @@
           <a:p>
             <a:fld id="{6C8DF065-2109-4FE1-9B02-7C1308B814F1}" type="datetimeFigureOut">
               <a:rPr lang="en-US" smtClean="0"/>
-              <a:t>2/11/2019</a:t>
+              <a:t>4/3/20</a:t>
             </a:fld>
             <a:endParaRPr lang="en-US"/>
           </a:p>
@@ -1834,7 +1818,7 @@
           <a:p>
             <a:fld id="{6C8DF065-2109-4FE1-9B02-7C1308B814F1}" type="datetimeFigureOut">
               <a:rPr lang="en-US" smtClean="0"/>
-              <a:t>2/11/2019</a:t>
+              <a:t>4/3/20</a:t>
             </a:fld>
             <a:endParaRPr lang="en-US"/>
           </a:p>
@@ -1937,10 +1921,9 @@
           </a:lstStyle>
           <a:p>
             <a:r>
-              <a:rPr lang="en-US" smtClean="0"/>
+              <a:rPr lang="en-US"/>
               <a:t>Click to edit Master title style</a:t>
             </a:r>
-            <a:endParaRPr lang="en-US"/>
           </a:p>
         </p:txBody>
       </p:sp>
@@ -1994,38 +1977,37 @@
           <a:p>
             <a:pPr lvl="0"/>
             <a:r>
-              <a:rPr lang="en-US" smtClean="0"/>
+              <a:rPr lang="en-US"/>
               <a:t>Click to edit Master text styles</a:t>
             </a:r>
           </a:p>
           <a:p>
             <a:pPr lvl="1"/>
             <a:r>
-              <a:rPr lang="en-US" smtClean="0"/>
+              <a:rPr lang="en-US"/>
               <a:t>Second level</a:t>
             </a:r>
           </a:p>
           <a:p>
             <a:pPr lvl="2"/>
             <a:r>
-              <a:rPr lang="en-US" smtClean="0"/>
+              <a:rPr lang="en-US"/>
               <a:t>Third level</a:t>
             </a:r>
           </a:p>
           <a:p>
             <a:pPr lvl="3"/>
             <a:r>
-              <a:rPr lang="en-US" smtClean="0"/>
+              <a:rPr lang="en-US"/>
               <a:t>Fourth level</a:t>
             </a:r>
           </a:p>
           <a:p>
             <a:pPr lvl="4"/>
             <a:r>
-              <a:rPr lang="en-US" smtClean="0"/>
+              <a:rPr lang="en-US"/>
               <a:t>Fifth level</a:t>
             </a:r>
-            <a:endParaRPr lang="en-US"/>
           </a:p>
         </p:txBody>
       </p:sp>
@@ -2088,7 +2070,7 @@
           <a:p>
             <a:pPr lvl="0"/>
             <a:r>
-              <a:rPr lang="en-US" smtClean="0"/>
+              <a:rPr lang="en-US"/>
               <a:t>Click to edit Master text styles</a:t>
             </a:r>
           </a:p>
@@ -2111,7 +2093,7 @@
           <a:p>
             <a:fld id="{6C8DF065-2109-4FE1-9B02-7C1308B814F1}" type="datetimeFigureOut">
               <a:rPr lang="en-US" smtClean="0"/>
-              <a:t>2/11/2019</a:t>
+              <a:t>4/3/20</a:t>
             </a:fld>
             <a:endParaRPr lang="en-US"/>
           </a:p>
@@ -2214,10 +2196,9 @@
           </a:lstStyle>
           <a:p>
             <a:r>
-              <a:rPr lang="en-US" smtClean="0"/>
+              <a:rPr lang="en-US"/>
               <a:t>Click to edit Master title style</a:t>
             </a:r>
-            <a:endParaRPr lang="en-US"/>
           </a:p>
         </p:txBody>
       </p:sp>
@@ -2341,7 +2322,7 @@
           <a:p>
             <a:pPr lvl="0"/>
             <a:r>
-              <a:rPr lang="en-US" smtClean="0"/>
+              <a:rPr lang="en-US"/>
               <a:t>Click to edit Master text styles</a:t>
             </a:r>
           </a:p>
@@ -2364,7 +2345,7 @@
           <a:p>
             <a:fld id="{6C8DF065-2109-4FE1-9B02-7C1308B814F1}" type="datetimeFigureOut">
               <a:rPr lang="en-US" smtClean="0"/>
-              <a:t>2/11/2019</a:t>
+              <a:t>4/3/20</a:t>
             </a:fld>
             <a:endParaRPr lang="en-US"/>
           </a:p>
@@ -2473,10 +2454,9 @@
           <a:lstStyle/>
           <a:p>
             <a:r>
-              <a:rPr lang="en-US" smtClean="0"/>
+              <a:rPr lang="en-US"/>
               <a:t>Click to edit Master title style</a:t>
             </a:r>
-            <a:endParaRPr lang="en-US"/>
           </a:p>
         </p:txBody>
       </p:sp>
@@ -2507,38 +2487,37 @@
           <a:p>
             <a:pPr lvl="0"/>
             <a:r>
-              <a:rPr lang="en-US" smtClean="0"/>
+              <a:rPr lang="en-US"/>
               <a:t>Click to edit Master text styles</a:t>
             </a:r>
           </a:p>
           <a:p>
             <a:pPr lvl="1"/>
             <a:r>
-              <a:rPr lang="en-US" smtClean="0"/>
+              <a:rPr lang="en-US"/>
               <a:t>Second level</a:t>
             </a:r>
           </a:p>
           <a:p>
             <a:pPr lvl="2"/>
             <a:r>
-              <a:rPr lang="en-US" smtClean="0"/>
+              <a:rPr lang="en-US"/>
               <a:t>Third level</a:t>
             </a:r>
           </a:p>
           <a:p>
             <a:pPr lvl="3"/>
             <a:r>
-              <a:rPr lang="en-US" smtClean="0"/>
+              <a:rPr lang="en-US"/>
               <a:t>Fourth level</a:t>
             </a:r>
           </a:p>
           <a:p>
             <a:pPr lvl="4"/>
             <a:r>
-              <a:rPr lang="en-US" smtClean="0"/>
+              <a:rPr lang="en-US"/>
               <a:t>Fifth level</a:t>
             </a:r>
-            <a:endParaRPr lang="en-US"/>
           </a:p>
         </p:txBody>
       </p:sp>
@@ -2577,7 +2556,7 @@
           <a:p>
             <a:fld id="{6C8DF065-2109-4FE1-9B02-7C1308B814F1}" type="datetimeFigureOut">
               <a:rPr lang="en-US" smtClean="0"/>
-              <a:t>2/11/2019</a:t>
+              <a:t>4/3/20</a:t>
             </a:fld>
             <a:endParaRPr lang="en-US"/>
           </a:p>
@@ -3005,7 +2984,7 @@
           <a:lstStyle/>
           <a:p>
             <a:r>
-              <a:rPr lang="en-US" sz="4800" smtClean="0"/>
+              <a:rPr lang="en-US" sz="4800"/>
               <a:t>Before we begin....</a:t>
             </a:r>
           </a:p>
@@ -3014,26 +2993,21 @@
           </a:p>
           <a:p>
             <a:r>
-              <a:rPr lang="en-US" sz="4800" smtClean="0"/>
-              <a:t>Any questions, comments, concerns</a:t>
-            </a:r>
-            <a:r>
-              <a:rPr lang="en-US" sz="4800" smtClean="0"/>
-              <a:t>?</a:t>
-            </a:r>
-          </a:p>
-          <a:p>
-            <a:r>
-              <a:rPr lang="en-US" sz="4800" smtClean="0"/>
+              <a:rPr lang="en-US" sz="4800"/>
+              <a:t>Any questions, comments, concerns?</a:t>
+            </a:r>
+          </a:p>
+          <a:p>
+            <a:r>
+              <a:rPr lang="en-US" sz="4800"/>
               <a:t>Goals from last week?</a:t>
             </a:r>
           </a:p>
           <a:p>
             <a:r>
-              <a:rPr lang="en-US" sz="4800" smtClean="0"/>
+              <a:rPr lang="en-US" sz="4800"/>
               <a:t>Goals for next week?</a:t>
             </a:r>
-            <a:endParaRPr lang="en-US" sz="4800"/>
           </a:p>
         </p:txBody>
       </p:sp>
@@ -3047,13 +3021,6 @@
   <p:clrMapOvr>
     <a:masterClrMapping/>
   </p:clrMapOvr>
-  <p:timing>
-    <p:tnLst>
-      <p:par>
-        <p:cTn id="1" dur="indefinite" restart="never" nodeType="tmRoot"/>
-      </p:par>
-    </p:tnLst>
-  </p:timing>
 </p:sld>
 </file>
 
@@ -3097,20 +3064,19 @@
           <a:lstStyle/>
           <a:p>
             <a:r>
-              <a:rPr lang="en-US" sz="4800" i="1" smtClean="0"/>
+              <a:rPr lang="en-US" sz="4800" i="1"/>
               <a:t>Part 2</a:t>
             </a:r>
             <a:r>
-              <a:rPr lang="en-US" sz="4800" smtClean="0"/>
+              <a:rPr lang="en-US" sz="4800"/>
               <a:t> </a:t>
             </a:r>
           </a:p>
           <a:p>
             <a:r>
-              <a:rPr lang="en-US" sz="4800" smtClean="0"/>
+              <a:rPr lang="en-US" sz="4800"/>
               <a:t>Theory and models of the Ocean Health Index</a:t>
             </a:r>
-            <a:endParaRPr lang="en-US" sz="4800"/>
           </a:p>
         </p:txBody>
       </p:sp>
@@ -3124,13 +3090,6 @@
   <p:clrMapOvr>
     <a:masterClrMapping/>
   </p:clrMapOvr>
-  <p:timing>
-    <p:tnLst>
-      <p:par>
-        <p:cTn id="1" dur="indefinite" restart="never" nodeType="tmRoot"/>
-      </p:par>
-    </p:tnLst>
-  </p:timing>
 </p:sld>
 </file>
 
@@ -3174,24 +3133,23 @@
           <a:lstStyle/>
           <a:p>
             <a:r>
-              <a:rPr lang="en-US" b="1" smtClean="0"/>
+              <a:rPr lang="en-US" b="1"/>
               <a:t>Week 2:</a:t>
             </a:r>
             <a:r>
-              <a:rPr lang="en-US" smtClean="0"/>
+              <a:rPr lang="en-US"/>
               <a:t> </a:t>
             </a:r>
             <a:r>
-              <a:rPr lang="en-US" i="1" smtClean="0"/>
+              <a:rPr lang="en-US" i="1"/>
               <a:t>Part 2</a:t>
             </a:r>
           </a:p>
           <a:p>
             <a:r>
-              <a:rPr lang="en-US" smtClean="0"/>
+              <a:rPr lang="en-US"/>
               <a:t>Theory and models of the Ocean Health Index</a:t>
             </a:r>
-            <a:endParaRPr lang="en-US"/>
           </a:p>
         </p:txBody>
       </p:sp>
@@ -3218,7 +3176,7 @@
           <a:lstStyle/>
           <a:p>
             <a:r>
-              <a:rPr lang="en-US" sz="4800" b="1" smtClean="0"/>
+              <a:rPr lang="en-US" sz="4800" b="1"/>
               <a:t>What is the Ocean Health Index?</a:t>
             </a:r>
           </a:p>
@@ -3247,16 +3205,16 @@
           <a:lstStyle/>
           <a:p>
             <a:r>
-              <a:rPr lang="en-US" sz="2400" smtClean="0"/>
+              <a:rPr lang="en-US" sz="2400"/>
               <a:t>The Ocean Health Index is a framework that provides a comprehensive assessment of ocean health!</a:t>
             </a:r>
           </a:p>
           <a:p>
-            <a:endParaRPr lang="en-US" sz="2000" smtClean="0"/>
-          </a:p>
-          <a:p>
-            <a:r>
-              <a:rPr lang="en-US" sz="2000" b="1" smtClean="0"/>
+            <a:endParaRPr lang="en-US" sz="2000"/>
+          </a:p>
+          <a:p>
+            <a:r>
+              <a:rPr lang="en-US" sz="2000" b="1"/>
               <a:t>Human-centric</a:t>
             </a:r>
           </a:p>
@@ -3266,7 +3224,7 @@
               <a:buChar char="•"/>
             </a:pPr>
             <a:r>
-              <a:rPr lang="en-US" sz="2000" smtClean="0"/>
+              <a:rPr lang="en-US" sz="2000"/>
               <a:t>Measures the health of resources that are directly important to humans</a:t>
             </a:r>
           </a:p>
@@ -3276,15 +3234,15 @@
               <a:buChar char="•"/>
             </a:pPr>
             <a:r>
-              <a:rPr lang="en-US" sz="2000" smtClean="0"/>
+              <a:rPr lang="en-US" sz="2000"/>
               <a:t>Rewards the </a:t>
             </a:r>
             <a:r>
-              <a:rPr lang="en-US" sz="2000" i="1" smtClean="0"/>
+              <a:rPr lang="en-US" sz="2000" i="1"/>
               <a:t>sustainable</a:t>
             </a:r>
             <a:r>
-              <a:rPr lang="en-US" sz="2000" smtClean="0"/>
+              <a:rPr lang="en-US" sz="2000"/>
               <a:t> extraction of resources from the ocean</a:t>
             </a:r>
           </a:p>
@@ -3296,7 +3254,7 @@
           </a:p>
           <a:p>
             <a:r>
-              <a:rPr lang="en-US" sz="2000" b="1" smtClean="0"/>
+              <a:rPr lang="en-US" sz="2000" b="1"/>
               <a:t>Adaptable</a:t>
             </a:r>
           </a:p>
@@ -3306,7 +3264,7 @@
               <a:buChar char="•"/>
             </a:pPr>
             <a:r>
-              <a:rPr lang="en-US" sz="2000" smtClean="0"/>
+              <a:rPr lang="en-US" sz="2000"/>
               <a:t>Can be applied to smaller spatial scales</a:t>
             </a:r>
           </a:p>
@@ -3316,7 +3274,7 @@
               <a:buChar char="•"/>
             </a:pPr>
             <a:r>
-              <a:rPr lang="en-US" sz="2000" smtClean="0"/>
+              <a:rPr lang="en-US" sz="2000"/>
               <a:t>Models can be adapted to better match the needs of different regions</a:t>
             </a:r>
           </a:p>
@@ -3329,7 +3287,7 @@
           </a:p>
           <a:p>
             <a:r>
-              <a:rPr lang="en-US" sz="2000" b="1" smtClean="0"/>
+              <a:rPr lang="en-US" sz="2000" b="1"/>
               <a:t>Comprehensive</a:t>
             </a:r>
           </a:p>
@@ -3339,7 +3297,7 @@
               <a:buChar char="•"/>
             </a:pPr>
             <a:r>
-              <a:rPr lang="en-US" sz="2000" smtClean="0"/>
+              <a:rPr lang="en-US" sz="2000"/>
               <a:t>Nearly 100 datasets are used to estimate Index scores</a:t>
             </a:r>
           </a:p>
@@ -3349,7 +3307,7 @@
               <a:buChar char="•"/>
             </a:pPr>
             <a:r>
-              <a:rPr lang="en-US" sz="2000" smtClean="0"/>
+              <a:rPr lang="en-US" sz="2000"/>
               <a:t>Combines lots of data (status, pressures, resilience, etc.) and indicators in a clever way to obtain a comprehensive view of ocean health</a:t>
             </a:r>
           </a:p>
@@ -3365,13 +3323,6 @@
   <p:clrMapOvr>
     <a:masterClrMapping/>
   </p:clrMapOvr>
-  <p:timing>
-    <p:tnLst>
-      <p:par>
-        <p:cTn id="1" dur="indefinite" restart="never" nodeType="tmRoot"/>
-      </p:par>
-    </p:tnLst>
-  </p:timing>
 </p:sld>
 </file>
 
@@ -3502,24 +3453,23 @@
           <a:lstStyle/>
           <a:p>
             <a:r>
-              <a:rPr lang="en-US" b="1" smtClean="0"/>
+              <a:rPr lang="en-US" b="1"/>
               <a:t>Week 2:</a:t>
             </a:r>
             <a:r>
-              <a:rPr lang="en-US" smtClean="0"/>
+              <a:rPr lang="en-US"/>
               <a:t> </a:t>
             </a:r>
             <a:r>
-              <a:rPr lang="en-US" i="1" smtClean="0"/>
+              <a:rPr lang="en-US" i="1"/>
               <a:t>Part 2</a:t>
             </a:r>
           </a:p>
           <a:p>
             <a:r>
-              <a:rPr lang="en-US" smtClean="0"/>
+              <a:rPr lang="en-US"/>
               <a:t>Theory and models of the Ocean Health Index</a:t>
             </a:r>
-            <a:endParaRPr lang="en-US"/>
           </a:p>
         </p:txBody>
       </p:sp>
@@ -3546,7 +3496,7 @@
           <a:lstStyle/>
           <a:p>
             <a:r>
-              <a:rPr lang="en-US" sz="4800" b="1" smtClean="0"/>
+              <a:rPr lang="en-US" sz="4800" b="1"/>
               <a:t>Breakdown of Index scores</a:t>
             </a:r>
           </a:p>
@@ -3574,33 +3524,15 @@
           <a:lstStyle/>
           <a:p>
             <a:r>
-              <a:rPr lang="en-US" sz="2400" b="1" smtClean="0"/>
+              <a:rPr lang="en-US" sz="2400" b="1"/>
               <a:t>Regional Index score</a:t>
             </a:r>
-            <a:endParaRPr lang="en-US" sz="2400" b="1"/>
-          </a:p>
-          <a:p>
-            <a:r>
-              <a:rPr lang="en-US" sz="2400" smtClean="0"/>
-              <a:t>Overall measure of how </a:t>
-            </a:r>
+          </a:p>
+          <a:p>
             <a:r>
               <a:rPr lang="en-US" sz="2400"/>
-              <a:t>well </a:t>
-            </a:r>
-            <a:r>
-              <a:rPr lang="en-US" sz="2400" smtClean="0"/>
-              <a:t>a region is </a:t>
-            </a:r>
-            <a:r>
-              <a:rPr lang="en-US" sz="2400"/>
-              <a:t>managing the resources we want and need from the ocean based on performance of 10 </a:t>
-            </a:r>
-            <a:r>
-              <a:rPr lang="en-US" sz="2400" smtClean="0"/>
-              <a:t>goals</a:t>
-            </a:r>
-            <a:endParaRPr lang="en-US" sz="2400"/>
+              <a:t>Overall measure of how well a region is managing the resources we want and need from the ocean based on performance of 10 goals</a:t>
+            </a:r>
           </a:p>
         </p:txBody>
       </p:sp>
@@ -3614,13 +3546,6 @@
   <p:clrMapOvr>
     <a:masterClrMapping/>
   </p:clrMapOvr>
-  <p:timing>
-    <p:tnLst>
-      <p:par>
-        <p:cTn id="1" dur="indefinite" restart="never" nodeType="tmRoot"/>
-      </p:par>
-    </p:tnLst>
-  </p:timing>
 </p:sld>
 </file>
 
@@ -3705,24 +3630,23 @@
           <a:lstStyle/>
           <a:p>
             <a:r>
-              <a:rPr lang="en-US" b="1" smtClean="0"/>
+              <a:rPr lang="en-US" b="1"/>
               <a:t>Week 2:</a:t>
             </a:r>
             <a:r>
-              <a:rPr lang="en-US" smtClean="0"/>
+              <a:rPr lang="en-US"/>
               <a:t> </a:t>
             </a:r>
             <a:r>
-              <a:rPr lang="en-US" i="1" smtClean="0"/>
+              <a:rPr lang="en-US" i="1"/>
               <a:t>Part 2</a:t>
             </a:r>
           </a:p>
           <a:p>
             <a:r>
-              <a:rPr lang="en-US" smtClean="0"/>
+              <a:rPr lang="en-US"/>
               <a:t>Theory and models of the Ocean Health Index</a:t>
             </a:r>
-            <a:endParaRPr lang="en-US"/>
           </a:p>
         </p:txBody>
       </p:sp>
@@ -3749,7 +3673,7 @@
           <a:lstStyle/>
           <a:p>
             <a:r>
-              <a:rPr lang="en-US" sz="4800" b="1" smtClean="0"/>
+              <a:rPr lang="en-US" sz="4800" b="1"/>
               <a:t>Breakdown of Index scores</a:t>
             </a:r>
           </a:p>
@@ -3777,10 +3701,9 @@
           <a:lstStyle/>
           <a:p>
             <a:r>
-              <a:rPr lang="en-US" b="1" smtClean="0"/>
+              <a:rPr lang="en-US" b="1"/>
               <a:t>What does the score measure???</a:t>
             </a:r>
-            <a:endParaRPr lang="en-US" b="1"/>
           </a:p>
         </p:txBody>
       </p:sp>
@@ -3807,33 +3730,32 @@
           <a:p>
             <a:pPr algn="ctr"/>
             <a:r>
-              <a:rPr lang="en-US" sz="1400" smtClean="0"/>
+              <a:rPr lang="en-US" sz="1400"/>
               <a:t>Average of </a:t>
             </a:r>
             <a:r>
-              <a:rPr lang="en-US" sz="1400" b="1" i="1" smtClean="0"/>
+              <a:rPr lang="en-US" sz="1400" b="1" i="1"/>
               <a:t>current</a:t>
             </a:r>
             <a:r>
-              <a:rPr lang="en-US" sz="1400" smtClean="0"/>
+              <a:rPr lang="en-US" sz="1400"/>
               <a:t> status </a:t>
             </a:r>
           </a:p>
           <a:p>
             <a:pPr algn="ctr"/>
             <a:r>
-              <a:rPr lang="en-US" sz="1400" smtClean="0"/>
+              <a:rPr lang="en-US" sz="1400"/>
               <a:t>and </a:t>
             </a:r>
             <a:r>
-              <a:rPr lang="en-US" sz="1400" b="1" i="1" smtClean="0"/>
+              <a:rPr lang="en-US" sz="1400" b="1" i="1"/>
               <a:t>predicted future status</a:t>
             </a:r>
             <a:r>
-              <a:rPr lang="en-US" sz="1400" smtClean="0"/>
+              <a:rPr lang="en-US" sz="1400"/>
               <a:t> in 5 years</a:t>
             </a:r>
-            <a:endParaRPr lang="en-US" sz="1400"/>
           </a:p>
         </p:txBody>
       </p:sp>
@@ -3859,10 +3781,9 @@
           <a:lstStyle/>
           <a:p>
             <a:r>
-              <a:rPr lang="en-US" sz="1400" smtClean="0"/>
+              <a:rPr lang="en-US" sz="1400"/>
               <a:t>Current state of the goal relative to some desired reference point</a:t>
             </a:r>
-            <a:endParaRPr lang="en-US" sz="1400"/>
           </a:p>
         </p:txBody>
       </p:sp>
@@ -3888,7 +3809,7 @@
           <a:lstStyle/>
           <a:p>
             <a:r>
-              <a:rPr lang="en-US" sz="1400" smtClean="0"/>
+              <a:rPr lang="en-US" sz="1400"/>
               <a:t>An estimate of the goal's future status in 5 years, based:</a:t>
             </a:r>
           </a:p>
@@ -3898,7 +3819,7 @@
               <a:buChar char="•"/>
             </a:pPr>
             <a:r>
-              <a:rPr lang="en-US" sz="1400" smtClean="0"/>
+              <a:rPr lang="en-US" sz="1400"/>
               <a:t>current status</a:t>
             </a:r>
           </a:p>
@@ -3908,7 +3829,7 @@
               <a:buChar char="•"/>
             </a:pPr>
             <a:r>
-              <a:rPr lang="en-US" sz="1400" smtClean="0"/>
+              <a:rPr lang="en-US" sz="1400"/>
               <a:t>recent changes in status (i.e., trend), </a:t>
             </a:r>
           </a:p>
@@ -3918,7 +3839,7 @@
               <a:buChar char="•"/>
             </a:pPr>
             <a:r>
-              <a:rPr lang="en-US" sz="1400" smtClean="0"/>
+              <a:rPr lang="en-US" sz="1400"/>
               <a:t>factors that threaten goal (i.e., pressure)</a:t>
             </a:r>
           </a:p>
@@ -3928,10 +3849,9 @@
               <a:buChar char="•"/>
             </a:pPr>
             <a:r>
-              <a:rPr lang="en-US" sz="1400" smtClean="0"/>
+              <a:rPr lang="en-US" sz="1400"/>
               <a:t>factors that preserve and protect goal (i.e., resilience)</a:t>
             </a:r>
-            <a:endParaRPr lang="en-US" sz="1400"/>
           </a:p>
         </p:txBody>
       </p:sp>
@@ -4004,10 +3924,9 @@
           <a:p>
             <a:pPr algn="ctr"/>
             <a:r>
-              <a:rPr lang="en-US" b="1" smtClean="0"/>
+              <a:rPr lang="en-US" b="1"/>
               <a:t>goal score</a:t>
             </a:r>
-            <a:endParaRPr lang="en-US" b="1"/>
           </a:p>
         </p:txBody>
       </p:sp>
@@ -4094,10 +4013,9 @@
             <a:p>
               <a:pPr algn="ctr"/>
               <a:r>
-                <a:rPr lang="en-US" sz="1600" b="1" smtClean="0"/>
+                <a:rPr lang="en-US" sz="1600" b="1"/>
                 <a:t>current status</a:t>
               </a:r>
-              <a:endParaRPr lang="en-US" sz="1600" b="1"/>
             </a:p>
           </p:txBody>
         </p:sp>
@@ -4170,10 +4088,9 @@
             <a:p>
               <a:pPr algn="ctr"/>
               <a:r>
-                <a:rPr lang="en-US" sz="1600" b="1" smtClean="0"/>
+                <a:rPr lang="en-US" sz="1600" b="1"/>
                 <a:t>future status</a:t>
               </a:r>
-              <a:endParaRPr lang="en-US" sz="1600" b="1"/>
             </a:p>
           </p:txBody>
         </p:sp>
@@ -4423,10 +4340,9 @@
               <a:p>
                 <a:pPr algn="ctr"/>
                 <a:r>
-                  <a:rPr lang="en-US" sz="1600" b="1" smtClean="0"/>
+                  <a:rPr lang="en-US" sz="1600" b="1"/>
                   <a:t>resilience</a:t>
                 </a:r>
-                <a:endParaRPr lang="en-US" sz="1600" b="1"/>
               </a:p>
             </p:txBody>
           </p:sp>
@@ -4499,10 +4415,9 @@
               <a:p>
                 <a:pPr algn="ctr"/>
                 <a:r>
-                  <a:rPr lang="en-US" sz="1600" b="1" smtClean="0"/>
+                  <a:rPr lang="en-US" sz="1600" b="1"/>
                   <a:t>pressures</a:t>
                 </a:r>
-                <a:endParaRPr lang="en-US" sz="1600" b="1"/>
               </a:p>
             </p:txBody>
           </p:sp>
@@ -4575,10 +4490,9 @@
               <a:p>
                 <a:pPr algn="ctr"/>
                 <a:r>
-                  <a:rPr lang="en-US" sz="1600" b="1" smtClean="0"/>
+                  <a:rPr lang="en-US" sz="1600" b="1"/>
                   <a:t>trend</a:t>
                 </a:r>
-                <a:endParaRPr lang="en-US" sz="1600" b="1"/>
               </a:p>
             </p:txBody>
           </p:sp>
@@ -5022,24 +4936,23 @@
           <a:lstStyle/>
           <a:p>
             <a:r>
-              <a:rPr lang="en-US" b="1" smtClean="0"/>
+              <a:rPr lang="en-US" b="1"/>
               <a:t>Week 2:</a:t>
             </a:r>
             <a:r>
-              <a:rPr lang="en-US" smtClean="0"/>
+              <a:rPr lang="en-US"/>
               <a:t> </a:t>
             </a:r>
             <a:r>
-              <a:rPr lang="en-US" i="1" smtClean="0"/>
+              <a:rPr lang="en-US" i="1"/>
               <a:t>Part 2</a:t>
             </a:r>
           </a:p>
           <a:p>
             <a:r>
-              <a:rPr lang="en-US" smtClean="0"/>
+              <a:rPr lang="en-US"/>
               <a:t>Theory and models of the Ocean Health Index</a:t>
             </a:r>
-            <a:endParaRPr lang="en-US"/>
           </a:p>
         </p:txBody>
       </p:sp>
@@ -5066,7 +4979,7 @@
           <a:lstStyle/>
           <a:p>
             <a:r>
-              <a:rPr lang="en-US" sz="4800" b="1" smtClean="0"/>
+              <a:rPr lang="en-US" sz="4800" b="1"/>
               <a:t>Getting familiar with the OHI</a:t>
             </a:r>
           </a:p>
@@ -5081,7 +4994,7 @@
         <p:spPr>
           <a:xfrm>
             <a:off x="718453" y="1887692"/>
-            <a:ext cx="10085382" cy="4739759"/>
+            <a:ext cx="10085382" cy="4462760"/>
           </a:xfrm>
           <a:prstGeom prst="rect">
             <a:avLst/>
@@ -5094,90 +5007,65 @@
           <a:lstStyle/>
           <a:p>
             <a:r>
-              <a:rPr lang="en-US" sz="3200" b="1" smtClean="0"/>
+              <a:rPr lang="en-US" sz="3200" b="1" dirty="0"/>
               <a:t>Your Mission</a:t>
             </a:r>
           </a:p>
           <a:p>
-            <a:endParaRPr lang="en-US" b="1"/>
-          </a:p>
-          <a:p>
-            <a:r>
-              <a:rPr lang="en-US" smtClean="0"/>
+            <a:endParaRPr lang="en-US" b="1" dirty="0"/>
+          </a:p>
+          <a:p>
+            <a:r>
+              <a:rPr lang="en-US" dirty="0"/>
               <a:t>Work together to answer the questions in this worksheet:</a:t>
             </a:r>
           </a:p>
           <a:p>
-            <a:endParaRPr lang="en-US"/>
-          </a:p>
-          <a:p>
-            <a:r>
-              <a:rPr lang="en-US">
+            <a:endParaRPr lang="en-US" dirty="0"/>
+          </a:p>
+          <a:p>
+            <a:r>
+              <a:rPr lang="en-US" dirty="0">
                 <a:hlinkClick r:id="rId2"/>
               </a:rPr>
-              <a:t>https://</a:t>
-            </a:r>
-            <a:r>
-              <a:rPr lang="en-US" smtClean="0">
-                <a:hlinkClick r:id="rId2"/>
-              </a:rPr>
-              <a:t>rawgit.com/OHI-Science/ohi-global/draft/global_supplement/exercises/exercise1.html</a:t>
-            </a:r>
-            <a:endParaRPr lang="en-US" smtClean="0"/>
-          </a:p>
-          <a:p>
-            <a:endParaRPr lang="en-US"/>
-          </a:p>
-          <a:p>
-            <a:r>
-              <a:rPr lang="en-US" smtClean="0"/>
+              <a:t>https://raw.githack.com/OHI-Science/ohiprep_v2020/gh-pages/Reference/Lessons_in_OHI/explore_theory/exercise1.html</a:t>
+            </a:r>
+            <a:endParaRPr lang="en-US" dirty="0"/>
+          </a:p>
+          <a:p>
+            <a:r>
+              <a:rPr lang="en-US" dirty="0"/>
               <a:t>All the information you need should be in the OHI global method document:</a:t>
             </a:r>
           </a:p>
           <a:p>
-            <a:endParaRPr lang="en-US" smtClean="0">
+            <a:endParaRPr lang="en-US" dirty="0">
               <a:hlinkClick r:id="rId3"/>
             </a:endParaRPr>
           </a:p>
           <a:p>
             <a:r>
-              <a:rPr lang="en-US">
+              <a:rPr lang="en-US" dirty="0">
                 <a:hlinkClick r:id="rId4"/>
               </a:rPr>
-              <a:t>https://</a:t>
-            </a:r>
-            <a:r>
-              <a:rPr lang="en-US" smtClean="0">
-                <a:hlinkClick r:id="rId4"/>
-              </a:rPr>
-              <a:t>raw.githack.com/OHI-Science/ohi-global/published/global_supplement/Supplement.html</a:t>
-            </a:r>
-            <a:endParaRPr lang="en-US" smtClean="0"/>
-          </a:p>
-          <a:p>
-            <a:endParaRPr lang="en-US" smtClean="0"/>
-          </a:p>
-          <a:p>
-            <a:r>
-              <a:rPr lang="en-US" b="1" i="1" smtClean="0"/>
+              <a:t>https://raw.githack.com/OHI-Science/ohi-global/published/documents/methods/Supplement.html#2_the_theory_of_ohi</a:t>
+            </a:r>
+            <a:endParaRPr lang="en-US" dirty="0"/>
+          </a:p>
+          <a:p>
+            <a:endParaRPr lang="en-US" dirty="0"/>
+          </a:p>
+          <a:p>
+            <a:r>
+              <a:rPr lang="en-US" b="1" i="1" dirty="0"/>
               <a:t>Slack me if you have questions or want any hints! I will check in every once in a while to see how you are doing! We will discuss this assignment next week!</a:t>
             </a:r>
           </a:p>
           <a:p>
-            <a:endParaRPr lang="en-US"/>
-          </a:p>
-          <a:p>
-            <a:r>
-              <a:rPr lang="en-US" smtClean="0"/>
-              <a:t>We will reconvene around 3 to discuss last week's assignment.</a:t>
-            </a:r>
-            <a:endParaRPr lang="en-US"/>
-          </a:p>
-          <a:p>
-            <a:endParaRPr lang="en-US" smtClean="0"/>
-          </a:p>
-          <a:p>
-            <a:endParaRPr lang="en-US"/>
+            <a:endParaRPr lang="en-US" dirty="0"/>
+          </a:p>
+          <a:p>
+            <a:endParaRPr lang="en-US" dirty="0"/>
           </a:p>
         </p:txBody>
       </p:sp>
@@ -5191,13 +5079,6 @@
   <p:clrMapOvr>
     <a:masterClrMapping/>
   </p:clrMapOvr>
-  <p:timing>
-    <p:tnLst>
-      <p:par>
-        <p:cTn id="1" dur="indefinite" restart="never" nodeType="tmRoot"/>
-      </p:par>
-    </p:tnLst>
-  </p:timing>
 </p:sld>
 </file>
 
@@ -5227,7 +5108,7 @@
         <p:spPr>
           <a:xfrm>
             <a:off x="577179" y="450455"/>
-            <a:ext cx="7543091" cy="5509200"/>
+            <a:ext cx="7543091" cy="3477875"/>
           </a:xfrm>
           <a:prstGeom prst="rect">
             <a:avLst/>
@@ -5241,82 +5122,52 @@
           <a:lstStyle/>
           <a:p>
             <a:r>
-              <a:rPr lang="en-US" sz="4800" b="1" smtClean="0"/>
+              <a:rPr lang="en-US" sz="4800" b="1" dirty="0"/>
               <a:t>Today's Plan</a:t>
             </a:r>
           </a:p>
           <a:p>
-            <a:endParaRPr lang="en-US" sz="4800" b="1" smtClean="0"/>
-          </a:p>
-          <a:p>
-            <a:r>
-              <a:rPr lang="en-US" sz="2800" b="1" smtClean="0"/>
-              <a:t>1-2 </a:t>
-            </a:r>
-            <a:r>
-              <a:rPr lang="en-US" sz="2800" b="1"/>
-              <a:t>pm</a:t>
-            </a:r>
-          </a:p>
-          <a:p>
-            <a:r>
-              <a:rPr lang="en-US" sz="2400" smtClean="0"/>
+            <a:r>
+              <a:rPr lang="en-US" sz="2400" dirty="0"/>
               <a:t>Last week's assignment</a:t>
             </a:r>
           </a:p>
           <a:p>
-            <a:endParaRPr lang="en-US" sz="2800" b="1" smtClean="0"/>
-          </a:p>
-          <a:p>
-            <a:r>
-              <a:rPr lang="en-US" sz="2800" b="1" smtClean="0"/>
-              <a:t>2-3 </a:t>
-            </a:r>
-            <a:r>
-              <a:rPr lang="en-US" sz="2800" b="1" smtClean="0"/>
-              <a:t>pm</a:t>
-            </a:r>
+            <a:endParaRPr lang="en-US" sz="2800" b="1" dirty="0"/>
           </a:p>
           <a:p>
             <a:pPr marL="514350" indent="-514350">
               <a:buAutoNum type="arabicPeriod"/>
             </a:pPr>
             <a:r>
-              <a:rPr lang="en-US" sz="2000" b="1" smtClean="0"/>
+              <a:rPr lang="en-US" sz="2000" b="1" dirty="0"/>
               <a:t>Overview of workflow</a:t>
             </a:r>
-            <a:endParaRPr lang="en-US" sz="2000" b="1"/>
           </a:p>
           <a:p>
             <a:pPr marL="514350" indent="-514350">
               <a:buAutoNum type="arabicPeriod"/>
             </a:pPr>
             <a:r>
-              <a:rPr lang="en-US" sz="2000" b="1" smtClean="0"/>
+              <a:rPr lang="en-US" sz="2000" b="1" dirty="0"/>
               <a:t>Overview of OHI theory and scores</a:t>
             </a:r>
           </a:p>
           <a:p>
-            <a:endParaRPr lang="en-US" sz="2000" b="1" smtClean="0"/>
-          </a:p>
-          <a:p>
-            <a:r>
-              <a:rPr lang="en-US" sz="2800" b="1" smtClean="0"/>
-              <a:t>3-Finish pm</a:t>
-            </a:r>
-          </a:p>
-          <a:p>
-            <a:r>
-              <a:rPr lang="en-US" sz="2000" b="1" smtClean="0"/>
+            <a:endParaRPr lang="en-US" sz="2000" b="1" dirty="0"/>
+          </a:p>
+          <a:p>
+            <a:r>
+              <a:rPr lang="en-US" sz="2000" b="1" dirty="0"/>
               <a:t>Work as a team on OHI assignment</a:t>
             </a:r>
           </a:p>
           <a:p>
-            <a:endParaRPr lang="en-US" sz="2000" b="1"/>
-          </a:p>
-          <a:p>
-            <a:r>
-              <a:rPr lang="en-US" sz="2000" b="1" smtClean="0"/>
+            <a:endParaRPr lang="en-US" sz="2000" b="1" dirty="0"/>
+          </a:p>
+          <a:p>
+            <a:r>
+              <a:rPr lang="en-US" sz="2000" b="1" dirty="0"/>
               <a:t> </a:t>
             </a:r>
           </a:p>
@@ -5332,13 +5183,6 @@
   <p:clrMapOvr>
     <a:masterClrMapping/>
   </p:clrMapOvr>
-  <p:timing>
-    <p:tnLst>
-      <p:par>
-        <p:cTn id="1" dur="indefinite" restart="never" nodeType="tmRoot"/>
-      </p:par>
-    </p:tnLst>
-  </p:timing>
 </p:sld>
 </file>
 
@@ -5382,16 +5226,15 @@
           <a:lstStyle/>
           <a:p>
             <a:r>
-              <a:rPr lang="en-US" sz="4800" i="1" smtClean="0"/>
+              <a:rPr lang="en-US" sz="4800" i="1"/>
               <a:t>Part 1</a:t>
             </a:r>
           </a:p>
           <a:p>
             <a:r>
-              <a:rPr lang="en-US" sz="4800" smtClean="0"/>
+              <a:rPr lang="en-US" sz="4800"/>
               <a:t>A super brief overview of our workflow!</a:t>
             </a:r>
-            <a:endParaRPr lang="en-US" sz="4800"/>
           </a:p>
         </p:txBody>
       </p:sp>
@@ -5405,13 +5248,6 @@
   <p:clrMapOvr>
     <a:masterClrMapping/>
   </p:clrMapOvr>
-  <p:timing>
-    <p:tnLst>
-      <p:par>
-        <p:cTn id="1" dur="indefinite" restart="never" nodeType="tmRoot"/>
-      </p:par>
-    </p:tnLst>
-  </p:timing>
 </p:sld>
 </file>
 
@@ -5455,24 +5291,23 @@
           <a:lstStyle/>
           <a:p>
             <a:r>
-              <a:rPr lang="en-US" b="1" smtClean="0"/>
+              <a:rPr lang="en-US" b="1"/>
               <a:t>Week 2:</a:t>
             </a:r>
             <a:r>
-              <a:rPr lang="en-US" smtClean="0"/>
+              <a:rPr lang="en-US"/>
               <a:t> </a:t>
             </a:r>
             <a:r>
-              <a:rPr lang="en-US" i="1" smtClean="0"/>
+              <a:rPr lang="en-US" i="1"/>
               <a:t>Part 1</a:t>
             </a:r>
           </a:p>
           <a:p>
             <a:r>
-              <a:rPr lang="en-US" smtClean="0"/>
+              <a:rPr lang="en-US"/>
               <a:t>A super brief overview of our workflow!</a:t>
             </a:r>
-            <a:endParaRPr lang="en-US"/>
           </a:p>
         </p:txBody>
       </p:sp>
@@ -5499,7 +5334,7 @@
           <a:lstStyle/>
           <a:p>
             <a:r>
-              <a:rPr lang="en-US" sz="2400" b="1" smtClean="0"/>
+              <a:rPr lang="en-US" sz="2400" b="1"/>
               <a:t>Nearly all the files we use to calculate the global OHI are located on Github under the OHI-Science organization</a:t>
             </a:r>
           </a:p>
@@ -5511,11 +5346,11 @@
           </a:p>
           <a:p>
             <a:r>
-              <a:rPr lang="en-US" sz="2400" b="1" u="sng" smtClean="0"/>
+              <a:rPr lang="en-US" sz="2400" b="1" u="sng"/>
               <a:t>Git</a:t>
             </a:r>
             <a:r>
-              <a:rPr lang="en-US" sz="2400" smtClean="0"/>
+              <a:rPr lang="en-US" sz="2400"/>
               <a:t> A version control system used to track changes in 	files and coordinate work</a:t>
             </a:r>
           </a:p>
@@ -5533,14 +5368,13 @@
           <a:p>
             <a:pPr marL="514350" indent="-514350"/>
             <a:r>
-              <a:rPr lang="en-US" sz="2400" b="1" u="sng" smtClean="0"/>
+              <a:rPr lang="en-US" sz="2400" b="1" u="sng"/>
               <a:t>GitHub</a:t>
             </a:r>
             <a:r>
-              <a:rPr lang="en-US" sz="2400" smtClean="0"/>
+              <a:rPr lang="en-US" sz="2400"/>
               <a:t> A web-based hosting service for Git.  Github allows us to seamlessly collaborate on projects and is what we use to make our code and data available to the public in real time!</a:t>
             </a:r>
-            <a:endParaRPr lang="en-US" sz="2400"/>
           </a:p>
         </p:txBody>
       </p:sp>
@@ -5660,13 +5494,6 @@
   <p:clrMapOvr>
     <a:masterClrMapping/>
   </p:clrMapOvr>
-  <p:timing>
-    <p:tnLst>
-      <p:par>
-        <p:cTn id="1" dur="indefinite" restart="never" nodeType="tmRoot"/>
-      </p:par>
-    </p:tnLst>
-  </p:timing>
 </p:sld>
 </file>
 
@@ -5710,24 +5537,23 @@
           <a:lstStyle/>
           <a:p>
             <a:r>
-              <a:rPr lang="en-US" b="1" smtClean="0"/>
+              <a:rPr lang="en-US" b="1"/>
               <a:t>Week 2:</a:t>
             </a:r>
             <a:r>
-              <a:rPr lang="en-US" smtClean="0"/>
+              <a:rPr lang="en-US"/>
               <a:t> </a:t>
             </a:r>
             <a:r>
-              <a:rPr lang="en-US" i="1" smtClean="0"/>
+              <a:rPr lang="en-US" i="1"/>
               <a:t>Part 1</a:t>
             </a:r>
           </a:p>
           <a:p>
             <a:r>
-              <a:rPr lang="en-US" smtClean="0"/>
+              <a:rPr lang="en-US"/>
               <a:t>A super brief overview of our workflow!</a:t>
             </a:r>
-            <a:endParaRPr lang="en-US"/>
           </a:p>
         </p:txBody>
       </p:sp>
@@ -5754,7 +5580,7 @@
           <a:lstStyle/>
           <a:p>
             <a:r>
-              <a:rPr lang="en-US" sz="2400" b="1" smtClean="0"/>
+              <a:rPr lang="en-US" sz="2400" b="1"/>
               <a:t>There are many repositories (a.k.a. "repos"), but the 3 that we use for OHI global are:</a:t>
             </a:r>
           </a:p>
@@ -5763,11 +5589,11 @@
           </a:p>
           <a:p>
             <a:r>
-              <a:rPr lang="en-US" sz="2400" b="1" u="sng" smtClean="0"/>
+              <a:rPr lang="en-US" sz="2400" b="1" u="sng"/>
               <a:t>ohiprep</a:t>
             </a:r>
             <a:r>
-              <a:rPr lang="en-US" sz="2400" smtClean="0"/>
+              <a:rPr lang="en-US" sz="2400"/>
               <a:t> R scripts and intermediate data we use to 	prepare the data for the OHI global toolbox</a:t>
             </a:r>
           </a:p>
@@ -5777,11 +5603,11 @@
           <a:p>
             <a:pPr marL="514350" indent="-514350"/>
             <a:r>
-              <a:rPr lang="en-US" sz="2400" b="1" u="sng" smtClean="0"/>
+              <a:rPr lang="en-US" sz="2400" b="1" u="sng"/>
               <a:t>ohi-global</a:t>
             </a:r>
             <a:r>
-              <a:rPr lang="en-US" sz="2400" smtClean="0"/>
+              <a:rPr lang="en-US" sz="2400"/>
               <a:t> The models and data used to calculate the global OHI scores</a:t>
             </a:r>
           </a:p>
@@ -5792,14 +5618,13 @@
           <a:p>
             <a:pPr marL="514350" indent="-514350"/>
             <a:r>
-              <a:rPr lang="en-US" sz="2400" b="1" u="sng" smtClean="0"/>
+              <a:rPr lang="en-US" sz="2400" b="1" u="sng"/>
               <a:t>ohicore</a:t>
             </a:r>
             <a:r>
-              <a:rPr lang="en-US" sz="2400" smtClean="0"/>
+              <a:rPr lang="en-US" sz="2400"/>
               <a:t> The general functions used to calculate OHI pressures, resilience, and scores</a:t>
             </a:r>
-            <a:endParaRPr lang="en-US" sz="2400"/>
           </a:p>
         </p:txBody>
       </p:sp>
@@ -5813,13 +5638,6 @@
   <p:clrMapOvr>
     <a:masterClrMapping/>
   </p:clrMapOvr>
-  <p:timing>
-    <p:tnLst>
-      <p:par>
-        <p:cTn id="1" dur="indefinite" restart="never" nodeType="tmRoot"/>
-      </p:par>
-    </p:tnLst>
-  </p:timing>
 </p:sld>
 </file>
 
@@ -5863,24 +5681,23 @@
           <a:lstStyle/>
           <a:p>
             <a:r>
-              <a:rPr lang="en-US" b="1" smtClean="0"/>
+              <a:rPr lang="en-US" b="1"/>
               <a:t>Week 2:</a:t>
             </a:r>
             <a:r>
-              <a:rPr lang="en-US" smtClean="0"/>
+              <a:rPr lang="en-US"/>
               <a:t> </a:t>
             </a:r>
             <a:r>
-              <a:rPr lang="en-US" i="1" smtClean="0"/>
+              <a:rPr lang="en-US" i="1"/>
               <a:t>Part 1</a:t>
             </a:r>
           </a:p>
           <a:p>
             <a:r>
-              <a:rPr lang="en-US" smtClean="0"/>
+              <a:rPr lang="en-US"/>
               <a:t>A super brief overview of our workflow!</a:t>
             </a:r>
-            <a:endParaRPr lang="en-US"/>
           </a:p>
         </p:txBody>
       </p:sp>
@@ -5907,34 +5724,58 @@
           <a:lstStyle/>
           <a:p>
             <a:r>
-              <a:rPr lang="en-US" sz="2400" b="1" smtClean="0"/>
-              <a:t>ohiprep_v2019/globalprep</a:t>
-            </a:r>
-          </a:p>
-          <a:p>
-            <a:r>
-              <a:rPr lang="en-US" sz="2400" smtClean="0"/>
+              <a:rPr lang="en-US" sz="2400" b="1" dirty="0"/>
+              <a:t>ohiprep_v2020/</a:t>
+            </a:r>
+            <a:r>
+              <a:rPr lang="en-US" sz="2400" b="1" dirty="0" err="1"/>
+              <a:t>globalprep</a:t>
+            </a:r>
+            <a:endParaRPr lang="en-US" sz="2400" b="1" dirty="0"/>
+          </a:p>
+          <a:p>
+            <a:r>
+              <a:rPr lang="en-US" sz="2400" dirty="0"/>
               <a:t>Files used to prepare data for the toolbox  </a:t>
             </a:r>
           </a:p>
           <a:p>
             <a:r>
-              <a:rPr lang="en-US" sz="2400"/>
+              <a:rPr lang="en-US" sz="2400" dirty="0"/>
               <a:t> </a:t>
             </a:r>
-            <a:endParaRPr lang="en-US" sz="2400" smtClean="0"/>
-          </a:p>
-          <a:p>
-            <a:r>
-              <a:rPr lang="en-US" sz="2400" b="1" smtClean="0"/>
-              <a:t>Folder heirarchy</a:t>
-            </a:r>
-            <a:endParaRPr lang="en-US" sz="2400" b="1"/>
-          </a:p>
-          <a:p>
-            <a:r>
-              <a:rPr lang="en-US" sz="1600" smtClean="0"/>
-              <a:t>    &gt; Folders for the individual goals, pressures, and resilience variables (e.g., ao, fis)  </a:t>
+          </a:p>
+          <a:p>
+            <a:r>
+              <a:rPr lang="en-US" sz="2400" b="1" dirty="0"/>
+              <a:t>Folder </a:t>
+            </a:r>
+            <a:r>
+              <a:rPr lang="en-US" sz="2400" b="1" dirty="0" err="1"/>
+              <a:t>heirarchy</a:t>
+            </a:r>
+            <a:endParaRPr lang="en-US" sz="2400" b="1" dirty="0"/>
+          </a:p>
+          <a:p>
+            <a:r>
+              <a:rPr lang="en-US" sz="1600" dirty="0"/>
+              <a:t>    &gt; Folders for the individual goals, pressures, and resilience variables (e.g., </a:t>
+            </a:r>
+            <a:r>
+              <a:rPr lang="en-US" sz="1600" dirty="0" err="1"/>
+              <a:t>ao</a:t>
+            </a:r>
+            <a:r>
+              <a:rPr lang="en-US" sz="1600" dirty="0"/>
+              <a:t>, </a:t>
+            </a:r>
+            <a:r>
+              <a:rPr lang="en-US" sz="1600" dirty="0" err="1"/>
+              <a:t>fis</a:t>
+            </a:r>
+            <a:r>
+              <a:rPr lang="en-US" sz="1600" dirty="0"/>
+              <a:t>)  </a:t>
             </a:r>
           </a:p>
         </p:txBody>
@@ -6066,7 +5907,7 @@
             <a:lstStyle/>
             <a:p>
               <a:r>
-                <a:rPr lang="en-US" sz="2000" b="1" smtClean="0">
+                <a:rPr lang="en-US" sz="2000" b="1">
                   <a:solidFill>
                     <a:srgbClr val="FF0000"/>
                   </a:solidFill>
@@ -6076,7 +5917,7 @@
             </a:p>
             <a:p>
               <a:r>
-                <a:rPr lang="en-US" sz="2000" smtClean="0"/>
+                <a:rPr lang="en-US" sz="2000"/>
                 <a:t>No data prep is done by hand or in Excel</a:t>
               </a:r>
             </a:p>
@@ -6086,7 +5927,7 @@
                 <a:buChar char="•"/>
               </a:pPr>
               <a:r>
-                <a:rPr lang="en-US" sz="2000" smtClean="0"/>
+                <a:rPr lang="en-US" sz="2000"/>
                 <a:t>Mistakes are too easy to make and often impossible to trace</a:t>
               </a:r>
             </a:p>
@@ -6096,7 +5937,7 @@
                 <a:buChar char="•"/>
               </a:pPr>
               <a:r>
-                <a:rPr lang="en-US" sz="2000" smtClean="0"/>
+                <a:rPr lang="en-US" sz="2000"/>
                 <a:t>Work is not replicable</a:t>
               </a:r>
             </a:p>
@@ -6132,21 +5973,16 @@
             <a:lstStyle/>
             <a:p>
               <a:r>
-                <a:rPr lang="en-US" sz="2000" b="1" smtClean="0"/>
-                <a:t>Example </a:t>
+                <a:rPr lang="en-US" sz="2000" b="1"/>
+                <a:t>Example data prep script (from Jamie): </a:t>
               </a:r>
-              <a:r>
-                <a:rPr lang="en-US" sz="2000" b="1"/>
-                <a:t>data prep script (from Jamie): </a:t>
-              </a:r>
-              <a:endParaRPr lang="en-US" sz="2000" b="1" smtClean="0"/>
             </a:p>
             <a:p>
               <a:r>
                 <a:rPr lang="en-US" sz="1600"/>
                 <a:t>http://ohi-science.org/ohiprep_v2019/globalprep/prs_oa/v2017/create_oa_layer.html</a:t>
               </a:r>
-              <a:endParaRPr lang="en-US" sz="2400" smtClean="0"/>
+              <a:endParaRPr lang="en-US" sz="2400"/>
             </a:p>
           </p:txBody>
         </p:sp>
@@ -6264,10 +6100,9 @@
           <a:lstStyle/>
           <a:p>
             <a:r>
-              <a:rPr lang="en-US" sz="1600" smtClean="0"/>
+              <a:rPr lang="en-US" sz="1600"/>
               <a:t>&gt; Folders for assessment years (e.g., v2017).  </a:t>
             </a:r>
-            <a:endParaRPr lang="en-US" sz="1600"/>
           </a:p>
         </p:txBody>
       </p:sp>
@@ -6348,7 +6183,7 @@
           <a:lstStyle/>
           <a:p>
             <a:r>
-              <a:rPr lang="en-US" sz="1600" smtClean="0"/>
+              <a:rPr lang="en-US" sz="1600"/>
               <a:t>&gt; Data and processing files:</a:t>
             </a:r>
           </a:p>
@@ -6358,7 +6193,7 @@
               <a:buChar char="•"/>
             </a:pPr>
             <a:r>
-              <a:rPr lang="en-US" sz="1600" smtClean="0"/>
+              <a:rPr lang="en-US" sz="1600"/>
               <a:t>R/Rmd scripts for data processing</a:t>
             </a:r>
           </a:p>
@@ -6368,7 +6203,7 @@
               <a:buChar char="•"/>
             </a:pPr>
             <a:r>
-              <a:rPr lang="en-US" sz="1600" smtClean="0"/>
+              <a:rPr lang="en-US" sz="1600"/>
               <a:t>README.md files describing the data</a:t>
             </a:r>
           </a:p>
@@ -6378,7 +6213,7 @@
               <a:buChar char="•"/>
             </a:pPr>
             <a:r>
-              <a:rPr lang="en-US" sz="1600" smtClean="0"/>
+              <a:rPr lang="en-US" sz="1600"/>
               <a:t>folder for intermediate data (int)</a:t>
             </a:r>
           </a:p>
@@ -6388,7 +6223,7 @@
               <a:buChar char="•"/>
             </a:pPr>
             <a:r>
-              <a:rPr lang="en-US" sz="1600" smtClean="0"/>
+              <a:rPr lang="en-US" sz="1600"/>
               <a:t> folder for final data (data, output)</a:t>
             </a:r>
           </a:p>
@@ -6398,7 +6233,7 @@
               <a:buChar char="•"/>
             </a:pPr>
             <a:r>
-              <a:rPr lang="en-US" sz="1600" smtClean="0"/>
+              <a:rPr lang="en-US" sz="1600"/>
               <a:t>other stuff</a:t>
             </a:r>
           </a:p>
@@ -6862,24 +6697,23 @@
           <a:lstStyle/>
           <a:p>
             <a:r>
-              <a:rPr lang="en-US" b="1" smtClean="0"/>
+              <a:rPr lang="en-US" b="1"/>
               <a:t>Week 2:</a:t>
             </a:r>
             <a:r>
-              <a:rPr lang="en-US" smtClean="0"/>
+              <a:rPr lang="en-US"/>
               <a:t> </a:t>
             </a:r>
             <a:r>
-              <a:rPr lang="en-US" i="1" smtClean="0"/>
+              <a:rPr lang="en-US" i="1"/>
               <a:t>Part 1</a:t>
             </a:r>
           </a:p>
           <a:p>
             <a:r>
-              <a:rPr lang="en-US" smtClean="0"/>
+              <a:rPr lang="en-US"/>
               <a:t>A super brief overview of our workflow!</a:t>
             </a:r>
-            <a:endParaRPr lang="en-US"/>
           </a:p>
         </p:txBody>
       </p:sp>
@@ -6906,9 +6740,14 @@
           <a:lstStyle/>
           <a:p>
             <a:r>
-              <a:rPr lang="en-US" sz="2400" b="1" smtClean="0"/>
-              <a:t>ohiprep_v2019/globalprep</a:t>
-            </a:r>
+              <a:rPr lang="en-US" sz="2400" b="1" dirty="0"/>
+              <a:t>ohiprep_v2020/</a:t>
+            </a:r>
+            <a:r>
+              <a:rPr lang="en-US" sz="2400" b="1" dirty="0" err="1"/>
+              <a:t>globalprep</a:t>
+            </a:r>
+            <a:endParaRPr lang="en-US" sz="2400" b="1" dirty="0"/>
           </a:p>
         </p:txBody>
       </p:sp>
@@ -6959,10 +6798,9 @@
           <a:lstStyle/>
           <a:p>
             <a:r>
-              <a:rPr lang="en-US" sz="1400" smtClean="0"/>
+              <a:rPr lang="en-US" sz="1400"/>
               <a:t>Artisanal opportunities: need data</a:t>
             </a:r>
-            <a:endParaRPr lang="en-US" sz="1400"/>
           </a:p>
         </p:txBody>
       </p:sp>
@@ -6996,7 +6834,7 @@
           <a:lstStyle/>
           <a:p>
             <a:r>
-              <a:rPr lang="en-US" sz="2400" smtClean="0"/>
+              <a:rPr lang="en-US" sz="2400"/>
               <a:t>A document describing our data organization: </a:t>
             </a:r>
           </a:p>
@@ -7005,7 +6843,6 @@
               <a:rPr lang="en-US"/>
               <a:t>http://ohi-science.org/ohiprep_v2019/Reference/SOP_dataOrganization/dataOrganization_SOP.html</a:t>
             </a:r>
-            <a:endParaRPr lang="en-US" smtClean="0"/>
           </a:p>
         </p:txBody>
       </p:sp>
@@ -7126,7 +6963,7 @@
           <a:lstStyle/>
           <a:p>
             <a:r>
-              <a:rPr lang="en-US" sz="2400" i="1" smtClean="0"/>
+              <a:rPr lang="en-US" sz="2400" i="1"/>
               <a:t>Final datasets for toolbox</a:t>
             </a:r>
           </a:p>
@@ -7179,7 +7016,7 @@
           <a:lstStyle/>
           <a:p>
             <a:r>
-              <a:rPr lang="en-US" sz="1600" i="1" smtClean="0"/>
+              <a:rPr lang="en-US" sz="1600" i="1"/>
               <a:t>data used to calculate scores</a:t>
             </a:r>
           </a:p>
@@ -7246,7 +7083,7 @@
           <a:lstStyle/>
           <a:p>
             <a:r>
-              <a:rPr lang="en-US" sz="1600" i="1" smtClean="0"/>
+              <a:rPr lang="en-US" sz="1600" i="1"/>
               <a:t>data to keep track of gapfilling</a:t>
             </a:r>
           </a:p>
@@ -7383,24 +7220,23 @@
           <a:lstStyle/>
           <a:p>
             <a:r>
-              <a:rPr lang="en-US" b="1" smtClean="0"/>
+              <a:rPr lang="en-US" b="1"/>
               <a:t>Week 2:</a:t>
             </a:r>
             <a:r>
-              <a:rPr lang="en-US" smtClean="0"/>
+              <a:rPr lang="en-US"/>
               <a:t> </a:t>
             </a:r>
             <a:r>
-              <a:rPr lang="en-US" i="1" smtClean="0"/>
+              <a:rPr lang="en-US" i="1"/>
               <a:t>Part 1</a:t>
             </a:r>
           </a:p>
           <a:p>
             <a:r>
-              <a:rPr lang="en-US" smtClean="0"/>
+              <a:rPr lang="en-US"/>
               <a:t>A super brief overview of our workflow!</a:t>
             </a:r>
-            <a:endParaRPr lang="en-US"/>
           </a:p>
         </p:txBody>
       </p:sp>
@@ -7427,25 +7263,25 @@
           <a:lstStyle/>
           <a:p>
             <a:r>
-              <a:rPr lang="en-US" sz="2400" b="1" smtClean="0"/>
+              <a:rPr lang="en-US" sz="2400" b="1"/>
               <a:t>ohi-global</a:t>
             </a:r>
           </a:p>
           <a:p>
-            <a:endParaRPr lang="en-US" sz="2400" smtClean="0"/>
-          </a:p>
-          <a:p>
-            <a:r>
-              <a:rPr lang="en-US" sz="2400" smtClean="0"/>
+            <a:endParaRPr lang="en-US" sz="2400"/>
+          </a:p>
+          <a:p>
+            <a:r>
+              <a:rPr lang="en-US" sz="2400"/>
               <a:t>Models and data used to calculate the global Ocean Health Index</a:t>
             </a:r>
           </a:p>
           <a:p>
-            <a:endParaRPr lang="en-US" smtClean="0"/>
-          </a:p>
-          <a:p>
-            <a:r>
-              <a:rPr lang="en-US" sz="2400" i="1" smtClean="0"/>
+            <a:endParaRPr lang="en-US"/>
+          </a:p>
+          <a:p>
+            <a:r>
+              <a:rPr lang="en-US" sz="2400" i="1"/>
               <a:t>The Highlights</a:t>
             </a:r>
           </a:p>
@@ -7454,154 +7290,129 @@
           </a:p>
           <a:p>
             <a:r>
-              <a:rPr lang="en-US" b="1" smtClean="0"/>
+              <a:rPr lang="en-US" b="1"/>
               <a:t>eez</a:t>
             </a:r>
             <a:r>
-              <a:rPr lang="en-US" smtClean="0"/>
+              <a:rPr lang="en-US"/>
               <a:t>  = folder with global models and data</a:t>
             </a:r>
           </a:p>
           <a:p>
             <a:r>
-              <a:rPr lang="en-US" smtClean="0"/>
+              <a:rPr lang="en-US"/>
               <a:t>    &gt; </a:t>
             </a:r>
             <a:r>
-              <a:rPr lang="en-US" b="1" smtClean="0"/>
+              <a:rPr lang="en-US" b="1"/>
               <a:t>layers</a:t>
             </a:r>
             <a:r>
-              <a:rPr lang="en-US" smtClean="0"/>
+              <a:rPr lang="en-US"/>
               <a:t> =  all data layers used in the models (data are copied from </a:t>
             </a:r>
           </a:p>
           <a:p>
             <a:r>
               <a:rPr lang="en-US"/>
-              <a:t> </a:t>
-            </a:r>
-            <a:r>
-              <a:rPr lang="en-US" smtClean="0"/>
-              <a:t>                     ohiprep, using paths located in: </a:t>
-            </a:r>
-            <a:r>
-              <a:rPr lang="en-US" b="1" smtClean="0"/>
+              <a:t>                      ohiprep, using paths located in: </a:t>
+            </a:r>
+            <a:r>
+              <a:rPr lang="en-US" b="1"/>
               <a:t>eez_layers_meta_data/layers_eez_base.csv</a:t>
             </a:r>
             <a:r>
-              <a:rPr lang="en-US" smtClean="0"/>
+              <a:rPr lang="en-US"/>
               <a:t>)</a:t>
             </a:r>
           </a:p>
           <a:p>
             <a:r>
               <a:rPr lang="en-US"/>
-              <a:t> </a:t>
-            </a:r>
-            <a:r>
-              <a:rPr lang="en-US" smtClean="0"/>
-              <a:t>   &gt; </a:t>
-            </a:r>
-            <a:r>
-              <a:rPr lang="en-US" b="1" smtClean="0"/>
+              <a:t>    &gt; </a:t>
+            </a:r>
+            <a:r>
+              <a:rPr lang="en-US" b="1"/>
               <a:t>conf</a:t>
             </a:r>
             <a:r>
-              <a:rPr lang="en-US" smtClean="0"/>
+              <a:rPr lang="en-US"/>
               <a:t> =   models and supplementary data used to calculate goal status, trend, </a:t>
             </a:r>
           </a:p>
           <a:p>
             <a:r>
               <a:rPr lang="en-US"/>
-              <a:t> </a:t>
-            </a:r>
-            <a:r>
-              <a:rPr lang="en-US" smtClean="0"/>
-              <a:t>                    pressure and resilience</a:t>
-            </a:r>
-          </a:p>
-          <a:p>
-            <a:r>
-              <a:rPr lang="en-US"/>
-              <a:t> </a:t>
-            </a:r>
-            <a:r>
-              <a:rPr lang="en-US" smtClean="0"/>
-              <a:t>   &gt; </a:t>
-            </a:r>
-            <a:r>
-              <a:rPr lang="en-US" b="1" smtClean="0"/>
+              <a:t>                     pressure and resilience</a:t>
+            </a:r>
+          </a:p>
+          <a:p>
+            <a:r>
+              <a:rPr lang="en-US"/>
+              <a:t>    &gt; </a:t>
+            </a:r>
+            <a:r>
+              <a:rPr lang="en-US" b="1"/>
               <a:t>calculate_scores.R </a:t>
             </a:r>
             <a:r>
-              <a:rPr lang="en-US" smtClean="0"/>
+              <a:rPr lang="en-US"/>
               <a:t>= script to run the toolbox to calculate scores </a:t>
             </a:r>
           </a:p>
           <a:p>
             <a:r>
               <a:rPr lang="en-US"/>
-              <a:t> </a:t>
-            </a:r>
-            <a:r>
-              <a:rPr lang="en-US" smtClean="0"/>
-              <a:t>   &gt; </a:t>
-            </a:r>
-            <a:r>
-              <a:rPr lang="en-US" b="1" smtClean="0"/>
+              <a:t>    &gt; </a:t>
+            </a:r>
+            <a:r>
+              <a:rPr lang="en-US" b="1"/>
               <a:t>scores.csv</a:t>
             </a:r>
             <a:r>
-              <a:rPr lang="en-US" smtClean="0"/>
+              <a:rPr lang="en-US"/>
               <a:t> = output from running the toolbox (includes all dimension scores for </a:t>
             </a:r>
           </a:p>
           <a:p>
             <a:r>
               <a:rPr lang="en-US"/>
-              <a:t>	</a:t>
-            </a:r>
-            <a:r>
-              <a:rPr lang="en-US" smtClean="0"/>
-              <a:t>	   each goal and country) </a:t>
-            </a:r>
-            <a:endParaRPr lang="en-US"/>
-          </a:p>
-          <a:p>
-            <a:endParaRPr lang="en-US" b="1" smtClean="0"/>
-          </a:p>
-          <a:p>
-            <a:r>
-              <a:rPr lang="en-US" b="1" smtClean="0"/>
+              <a:t>		   each goal and country) </a:t>
+            </a:r>
+          </a:p>
+          <a:p>
+            <a:endParaRPr lang="en-US" b="1"/>
+          </a:p>
+          <a:p>
+            <a:r>
+              <a:rPr lang="en-US" b="1"/>
               <a:t>eez_layers_meta_data </a:t>
             </a:r>
             <a:r>
-              <a:rPr lang="en-US" smtClean="0"/>
+              <a:rPr lang="en-US"/>
               <a:t>= Several csv files describing data layers</a:t>
             </a:r>
           </a:p>
           <a:p>
             <a:r>
-              <a:rPr lang="en-US" b="1" smtClean="0"/>
+              <a:rPr lang="en-US" b="1"/>
               <a:t>global_supplement </a:t>
             </a:r>
             <a:r>
-              <a:rPr lang="en-US" smtClean="0"/>
+              <a:rPr lang="en-US"/>
               <a:t>= Files used to create OHI methods document,  </a:t>
             </a:r>
           </a:p>
           <a:p>
             <a:r>
-              <a:rPr lang="en-US" b="1" smtClean="0"/>
+              <a:rPr lang="en-US" b="1"/>
               <a:t>yearly_results </a:t>
             </a:r>
             <a:r>
-              <a:rPr lang="en-US" smtClean="0"/>
+              <a:rPr lang="en-US"/>
               <a:t>= Reporting on results of OHI assessments</a:t>
             </a:r>
-            <a:endParaRPr lang="en-US" b="1" smtClean="0"/>
+            <a:endParaRPr lang="en-US" b="1"/>
           </a:p>
         </p:txBody>
       </p:sp>
@@ -7835,13 +7646,6 @@
   <p:clrMapOvr>
     <a:masterClrMapping/>
   </p:clrMapOvr>
-  <p:timing>
-    <p:tnLst>
-      <p:par>
-        <p:cTn id="1" dur="indefinite" restart="never" nodeType="tmRoot"/>
-      </p:par>
-    </p:tnLst>
-  </p:timing>
 </p:sld>
 </file>
 
@@ -7885,24 +7689,23 @@
           <a:lstStyle/>
           <a:p>
             <a:r>
-              <a:rPr lang="en-US" b="1" smtClean="0"/>
+              <a:rPr lang="en-US" b="1"/>
               <a:t>Week 2:</a:t>
             </a:r>
             <a:r>
-              <a:rPr lang="en-US" smtClean="0"/>
+              <a:rPr lang="en-US"/>
               <a:t> </a:t>
             </a:r>
             <a:r>
-              <a:rPr lang="en-US" i="1" smtClean="0"/>
+              <a:rPr lang="en-US" i="1"/>
               <a:t>Part 1</a:t>
             </a:r>
           </a:p>
           <a:p>
             <a:r>
-              <a:rPr lang="en-US" smtClean="0"/>
+              <a:rPr lang="en-US"/>
               <a:t>A super brief overview of our workflow!</a:t>
             </a:r>
-            <a:endParaRPr lang="en-US"/>
           </a:p>
         </p:txBody>
       </p:sp>
@@ -7929,25 +7732,25 @@
           <a:lstStyle/>
           <a:p>
             <a:r>
-              <a:rPr lang="en-US" sz="2400" b="1" smtClean="0"/>
+              <a:rPr lang="en-US" sz="2400" b="1"/>
               <a:t>ohicore</a:t>
             </a:r>
           </a:p>
           <a:p>
-            <a:endParaRPr lang="en-US" sz="2400" smtClean="0"/>
-          </a:p>
-          <a:p>
-            <a:r>
-              <a:rPr lang="en-US" sz="2400" smtClean="0"/>
+            <a:endParaRPr lang="en-US" sz="2400"/>
+          </a:p>
+          <a:p>
+            <a:r>
+              <a:rPr lang="en-US" sz="2400"/>
               <a:t>An R package with the generic functions used to create special OHI objects and calculate scores</a:t>
             </a:r>
           </a:p>
           <a:p>
-            <a:endParaRPr lang="en-US" sz="2400" smtClean="0"/>
-          </a:p>
-          <a:p>
-            <a:r>
-              <a:rPr lang="en-US" sz="2400" smtClean="0"/>
+            <a:endParaRPr lang="en-US" sz="2400"/>
+          </a:p>
+          <a:p>
+            <a:r>
+              <a:rPr lang="en-US" sz="2400"/>
               <a:t>Functions include:</a:t>
             </a:r>
           </a:p>
@@ -7957,7 +7760,7 @@
               <a:buChar char="•"/>
             </a:pPr>
             <a:r>
-              <a:rPr lang="en-US" sz="2400" smtClean="0"/>
+              <a:rPr lang="en-US" sz="2400"/>
               <a:t>CalculatePressuresAll</a:t>
             </a:r>
           </a:p>
@@ -7967,7 +7770,7 @@
               <a:buChar char="•"/>
             </a:pPr>
             <a:r>
-              <a:rPr lang="en-US" sz="2400" smtClean="0"/>
+              <a:rPr lang="en-US" sz="2400"/>
               <a:t>CalculateResilienceAll</a:t>
             </a:r>
           </a:p>
@@ -7979,7 +7782,7 @@
           </a:p>
           <a:p>
             <a:r>
-              <a:rPr lang="en-US" sz="2400" smtClean="0">
+              <a:rPr lang="en-US" sz="2400">
                 <a:solidFill>
                   <a:srgbClr val="FF0000"/>
                 </a:solidFill>
@@ -8007,13 +7810,6 @@
   <p:clrMapOvr>
     <a:masterClrMapping/>
   </p:clrMapOvr>
-  <p:timing>
-    <p:tnLst>
-      <p:par>
-        <p:cTn id="1" dur="indefinite" restart="never" nodeType="tmRoot"/>
-      </p:par>
-    </p:tnLst>
-  </p:timing>
 </p:sld>
 </file>
 

</xml_diff>